<commit_message>
Minor updates to slides
</commit_message>
<xml_diff>
--- a/Final Project Presentation.pptx
+++ b/Final Project Presentation.pptx
@@ -7106,7 +7106,7 @@
         </p:nvSpPr>
         <p:spPr>
           <a:xfrm>
-            <a:off x="10354646" y="440603"/>
+            <a:off x="10432444" y="409933"/>
             <a:ext cx="1235613" cy="307777"/>
           </a:xfrm>
           <a:prstGeom prst="rect">
@@ -7225,7 +7225,7 @@
         </p:nvSpPr>
         <p:spPr>
           <a:xfrm>
-            <a:off x="11050251" y="3764412"/>
+            <a:off x="11050250" y="3813081"/>
             <a:ext cx="1235613" cy="307777"/>
           </a:xfrm>
           <a:prstGeom prst="rect">

</xml_diff>